<commit_message>
update cve-2015-8961（to be continued）
</commit_message>
<xml_diff>
--- a/UAF/2015/CVE-2015-8961.pptx
+++ b/UAF/2015/CVE-2015-8961.pptx
@@ -5,14 +5,14 @@
     <p:sldMasterId id="2147483648" r:id="rId1"/>
   </p:sldMasterIdLst>
   <p:sldIdLst>
-    <p:sldId id="256" r:id="rId3"/>
-    <p:sldId id="258" r:id="rId4"/>
-    <p:sldId id="257" r:id="rId5"/>
-    <p:sldId id="259" r:id="rId6"/>
-    <p:sldId id="260" r:id="rId7"/>
+    <p:sldId id="256" r:id="rId2"/>
+    <p:sldId id="258" r:id="rId3"/>
+    <p:sldId id="257" r:id="rId4"/>
+    <p:sldId id="259" r:id="rId5"/>
+    <p:sldId id="260" r:id="rId6"/>
   </p:sldIdLst>
   <p:sldSz cx="12192000" cy="6858000"/>
-  <p:notesSz cx="7103745" cy="10234295"/>
+  <p:notesSz cx="7104063" cy="10234613"/>
   <p:defaultTextStyle>
     <a:defPPr>
       <a:defRPr lang="en-US"/>
@@ -108,6 +108,14 @@
       </a:defRPr>
     </a:lvl9pPr>
   </p:defaultTextStyle>
+  <p:extLst>
+    <p:ext uri="{EFAFB233-063F-42B5-8137-9DF3F51BA10A}">
+      <p15:sldGuideLst xmlns:p15="http://schemas.microsoft.com/office/powerpoint/2012/main"/>
+    </p:ext>
+    <p:ext uri="{2D200454-40CA-4A62-9FC3-DE9A4176ACB9}">
+      <p15:notesGuideLst xmlns:p15="http://schemas.microsoft.com/office/powerpoint/2012/main"/>
+    </p:ext>
+  </p:extLst>
 </p:presentation>
 </file>
 
@@ -242,6 +250,7 @@
           <a:p>
             <a:fld id="{FDE934FF-F4E1-47C5-9CA5-30A81DDE2BE4}" type="datetimeFigureOut">
               <a:rPr lang="en-US" smtClean="0"/>
+              <a:t>1/2/2019</a:t>
             </a:fld>
             <a:endParaRPr lang="en-US"/>
           </a:p>
@@ -283,6 +292,7 @@
           <a:p>
             <a:fld id="{B3561BA9-CDCF-4958-B8AB-66F3BF063E13}" type="slidenum">
               <a:rPr lang="en-US" smtClean="0"/>
+              <a:t>‹#›</a:t>
             </a:fld>
             <a:endParaRPr lang="en-US"/>
           </a:p>
@@ -338,7 +348,6 @@
               <a:rPr lang="en-US" smtClean="0"/>
               <a:t>Click to edit Master text styles</a:t>
             </a:r>
-            <a:endParaRPr lang="en-US" smtClean="0"/>
           </a:p>
           <a:p>
             <a:pPr lvl="1"/>
@@ -346,7 +355,6 @@
               <a:rPr lang="en-US" smtClean="0"/>
               <a:t>Second level</a:t>
             </a:r>
-            <a:endParaRPr lang="en-US" smtClean="0"/>
           </a:p>
           <a:p>
             <a:pPr lvl="2"/>
@@ -354,7 +362,6 @@
               <a:rPr lang="en-US" smtClean="0"/>
               <a:t>Third level</a:t>
             </a:r>
-            <a:endParaRPr lang="en-US" smtClean="0"/>
           </a:p>
           <a:p>
             <a:pPr lvl="3"/>
@@ -362,7 +369,6 @@
               <a:rPr lang="en-US" smtClean="0"/>
               <a:t>Fourth level</a:t>
             </a:r>
-            <a:endParaRPr lang="en-US" smtClean="0"/>
           </a:p>
           <a:p>
             <a:pPr lvl="4"/>
@@ -391,6 +397,7 @@
           <a:p>
             <a:fld id="{FDE934FF-F4E1-47C5-9CA5-30A81DDE2BE4}" type="datetimeFigureOut">
               <a:rPr lang="en-US" smtClean="0"/>
+              <a:t>1/2/2019</a:t>
             </a:fld>
             <a:endParaRPr lang="en-US"/>
           </a:p>
@@ -432,6 +439,7 @@
           <a:p>
             <a:fld id="{B3561BA9-CDCF-4958-B8AB-66F3BF063E13}" type="slidenum">
               <a:rPr lang="en-US" smtClean="0"/>
+              <a:t>‹#›</a:t>
             </a:fld>
             <a:endParaRPr lang="en-US"/>
           </a:p>
@@ -505,7 +513,6 @@
               <a:rPr lang="en-US" smtClean="0"/>
               <a:t>Click to edit Master text styles</a:t>
             </a:r>
-            <a:endParaRPr lang="en-US" smtClean="0"/>
           </a:p>
           <a:p>
             <a:pPr lvl="1"/>
@@ -513,7 +520,6 @@
               <a:rPr lang="en-US" smtClean="0"/>
               <a:t>Second level</a:t>
             </a:r>
-            <a:endParaRPr lang="en-US" smtClean="0"/>
           </a:p>
           <a:p>
             <a:pPr lvl="2"/>
@@ -521,7 +527,6 @@
               <a:rPr lang="en-US" smtClean="0"/>
               <a:t>Third level</a:t>
             </a:r>
-            <a:endParaRPr lang="en-US" smtClean="0"/>
           </a:p>
           <a:p>
             <a:pPr lvl="3"/>
@@ -529,7 +534,6 @@
               <a:rPr lang="en-US" smtClean="0"/>
               <a:t>Fourth level</a:t>
             </a:r>
-            <a:endParaRPr lang="en-US" smtClean="0"/>
           </a:p>
           <a:p>
             <a:pPr lvl="4"/>
@@ -558,6 +562,7 @@
           <a:p>
             <a:fld id="{FDE934FF-F4E1-47C5-9CA5-30A81DDE2BE4}" type="datetimeFigureOut">
               <a:rPr lang="en-US" smtClean="0"/>
+              <a:t>1/2/2019</a:t>
             </a:fld>
             <a:endParaRPr lang="en-US"/>
           </a:p>
@@ -599,6 +604,7 @@
           <a:p>
             <a:fld id="{B3561BA9-CDCF-4958-B8AB-66F3BF063E13}" type="slidenum">
               <a:rPr lang="en-US" smtClean="0"/>
+              <a:t>‹#›</a:t>
             </a:fld>
             <a:endParaRPr lang="en-US"/>
           </a:p>
@@ -777,7 +783,6 @@
               <a:rPr lang="en-US" smtClean="0"/>
               <a:t>Click to edit Master text styles</a:t>
             </a:r>
-            <a:endParaRPr lang="en-US" smtClean="0"/>
           </a:p>
         </p:txBody>
       </p:sp>
@@ -798,6 +803,7 @@
           <a:p>
             <a:fld id="{FDE934FF-F4E1-47C5-9CA5-30A81DDE2BE4}" type="datetimeFigureOut">
               <a:rPr lang="en-US" smtClean="0"/>
+              <a:t>1/2/2019</a:t>
             </a:fld>
             <a:endParaRPr lang="en-US"/>
           </a:p>
@@ -839,6 +845,7 @@
           <a:p>
             <a:fld id="{B3561BA9-CDCF-4958-B8AB-66F3BF063E13}" type="slidenum">
               <a:rPr lang="en-US" smtClean="0"/>
+              <a:t>‹#›</a:t>
             </a:fld>
             <a:endParaRPr lang="en-US"/>
           </a:p>
@@ -917,7 +924,6 @@
               <a:rPr lang="en-US" smtClean="0"/>
               <a:t>Click to edit Master text styles</a:t>
             </a:r>
-            <a:endParaRPr lang="en-US" smtClean="0"/>
           </a:p>
           <a:p>
             <a:pPr lvl="1"/>
@@ -925,7 +931,6 @@
               <a:rPr lang="en-US" smtClean="0"/>
               <a:t>Second level</a:t>
             </a:r>
-            <a:endParaRPr lang="en-US" smtClean="0"/>
           </a:p>
           <a:p>
             <a:pPr lvl="2"/>
@@ -933,7 +938,6 @@
               <a:rPr lang="en-US" smtClean="0"/>
               <a:t>Third level</a:t>
             </a:r>
-            <a:endParaRPr lang="en-US" smtClean="0"/>
           </a:p>
           <a:p>
             <a:pPr lvl="3"/>
@@ -941,7 +945,6 @@
               <a:rPr lang="en-US" smtClean="0"/>
               <a:t>Fourth level</a:t>
             </a:r>
-            <a:endParaRPr lang="en-US" smtClean="0"/>
           </a:p>
           <a:p>
             <a:pPr lvl="4"/>
@@ -978,7 +981,6 @@
               <a:rPr lang="en-US" smtClean="0"/>
               <a:t>Click to edit Master text styles</a:t>
             </a:r>
-            <a:endParaRPr lang="en-US" smtClean="0"/>
           </a:p>
           <a:p>
             <a:pPr lvl="1"/>
@@ -986,7 +988,6 @@
               <a:rPr lang="en-US" smtClean="0"/>
               <a:t>Second level</a:t>
             </a:r>
-            <a:endParaRPr lang="en-US" smtClean="0"/>
           </a:p>
           <a:p>
             <a:pPr lvl="2"/>
@@ -994,7 +995,6 @@
               <a:rPr lang="en-US" smtClean="0"/>
               <a:t>Third level</a:t>
             </a:r>
-            <a:endParaRPr lang="en-US" smtClean="0"/>
           </a:p>
           <a:p>
             <a:pPr lvl="3"/>
@@ -1002,7 +1002,6 @@
               <a:rPr lang="en-US" smtClean="0"/>
               <a:t>Fourth level</a:t>
             </a:r>
-            <a:endParaRPr lang="en-US" smtClean="0"/>
           </a:p>
           <a:p>
             <a:pPr lvl="4"/>
@@ -1031,6 +1030,7 @@
           <a:p>
             <a:fld id="{FDE934FF-F4E1-47C5-9CA5-30A81DDE2BE4}" type="datetimeFigureOut">
               <a:rPr lang="en-US" smtClean="0"/>
+              <a:t>1/2/2019</a:t>
             </a:fld>
             <a:endParaRPr lang="en-US"/>
           </a:p>
@@ -1072,6 +1072,7 @@
           <a:p>
             <a:fld id="{B3561BA9-CDCF-4958-B8AB-66F3BF063E13}" type="slidenum">
               <a:rPr lang="en-US" smtClean="0"/>
+              <a:t>‹#›</a:t>
             </a:fld>
             <a:endParaRPr lang="en-US"/>
           </a:p>
@@ -1192,7 +1193,6 @@
               <a:rPr lang="en-US" smtClean="0"/>
               <a:t>Click to edit Master text styles</a:t>
             </a:r>
-            <a:endParaRPr lang="en-US" smtClean="0"/>
           </a:p>
         </p:txBody>
       </p:sp>
@@ -1221,7 +1221,6 @@
               <a:rPr lang="en-US" smtClean="0"/>
               <a:t>Click to edit Master text styles</a:t>
             </a:r>
-            <a:endParaRPr lang="en-US" smtClean="0"/>
           </a:p>
           <a:p>
             <a:pPr lvl="1"/>
@@ -1229,7 +1228,6 @@
               <a:rPr lang="en-US" smtClean="0"/>
               <a:t>Second level</a:t>
             </a:r>
-            <a:endParaRPr lang="en-US" smtClean="0"/>
           </a:p>
           <a:p>
             <a:pPr lvl="2"/>
@@ -1237,7 +1235,6 @@
               <a:rPr lang="en-US" smtClean="0"/>
               <a:t>Third level</a:t>
             </a:r>
-            <a:endParaRPr lang="en-US" smtClean="0"/>
           </a:p>
           <a:p>
             <a:pPr lvl="3"/>
@@ -1245,7 +1242,6 @@
               <a:rPr lang="en-US" smtClean="0"/>
               <a:t>Fourth level</a:t>
             </a:r>
-            <a:endParaRPr lang="en-US" smtClean="0"/>
           </a:p>
           <a:p>
             <a:pPr lvl="4"/>
@@ -1319,7 +1315,6 @@
               <a:rPr lang="en-US" smtClean="0"/>
               <a:t>Click to edit Master text styles</a:t>
             </a:r>
-            <a:endParaRPr lang="en-US" smtClean="0"/>
           </a:p>
         </p:txBody>
       </p:sp>
@@ -1348,7 +1343,6 @@
               <a:rPr lang="en-US" smtClean="0"/>
               <a:t>Click to edit Master text styles</a:t>
             </a:r>
-            <a:endParaRPr lang="en-US" smtClean="0"/>
           </a:p>
           <a:p>
             <a:pPr lvl="1"/>
@@ -1356,7 +1350,6 @@
               <a:rPr lang="en-US" smtClean="0"/>
               <a:t>Second level</a:t>
             </a:r>
-            <a:endParaRPr lang="en-US" smtClean="0"/>
           </a:p>
           <a:p>
             <a:pPr lvl="2"/>
@@ -1364,7 +1357,6 @@
               <a:rPr lang="en-US" smtClean="0"/>
               <a:t>Third level</a:t>
             </a:r>
-            <a:endParaRPr lang="en-US" smtClean="0"/>
           </a:p>
           <a:p>
             <a:pPr lvl="3"/>
@@ -1372,7 +1364,6 @@
               <a:rPr lang="en-US" smtClean="0"/>
               <a:t>Fourth level</a:t>
             </a:r>
-            <a:endParaRPr lang="en-US" smtClean="0"/>
           </a:p>
           <a:p>
             <a:pPr lvl="4"/>
@@ -1401,6 +1392,7 @@
           <a:p>
             <a:fld id="{FDE934FF-F4E1-47C5-9CA5-30A81DDE2BE4}" type="datetimeFigureOut">
               <a:rPr lang="en-US" smtClean="0"/>
+              <a:t>1/2/2019</a:t>
             </a:fld>
             <a:endParaRPr lang="en-US"/>
           </a:p>
@@ -1442,6 +1434,7 @@
           <a:p>
             <a:fld id="{B3561BA9-CDCF-4958-B8AB-66F3BF063E13}" type="slidenum">
               <a:rPr lang="en-US" smtClean="0"/>
+              <a:t>‹#›</a:t>
             </a:fld>
             <a:endParaRPr lang="en-US"/>
           </a:p>
@@ -1512,6 +1505,7 @@
           <a:p>
             <a:fld id="{FDE934FF-F4E1-47C5-9CA5-30A81DDE2BE4}" type="datetimeFigureOut">
               <a:rPr lang="en-US" smtClean="0"/>
+              <a:t>1/2/2019</a:t>
             </a:fld>
             <a:endParaRPr lang="en-US"/>
           </a:p>
@@ -1553,6 +1547,7 @@
           <a:p>
             <a:fld id="{B3561BA9-CDCF-4958-B8AB-66F3BF063E13}" type="slidenum">
               <a:rPr lang="en-US" smtClean="0"/>
+              <a:t>‹#›</a:t>
             </a:fld>
             <a:endParaRPr lang="en-US"/>
           </a:p>
@@ -1600,6 +1595,7 @@
           <a:p>
             <a:fld id="{FDE934FF-F4E1-47C5-9CA5-30A81DDE2BE4}" type="datetimeFigureOut">
               <a:rPr lang="en-US" smtClean="0"/>
+              <a:t>1/2/2019</a:t>
             </a:fld>
             <a:endParaRPr lang="en-US"/>
           </a:p>
@@ -1641,6 +1637,7 @@
           <a:p>
             <a:fld id="{B3561BA9-CDCF-4958-B8AB-66F3BF063E13}" type="slidenum">
               <a:rPr lang="en-US" smtClean="0"/>
+              <a:t>‹#›</a:t>
             </a:fld>
             <a:endParaRPr lang="en-US"/>
           </a:p>
@@ -1826,7 +1823,6 @@
               <a:rPr lang="en-US" smtClean="0"/>
               <a:t>Click to edit Master text styles</a:t>
             </a:r>
-            <a:endParaRPr lang="en-US" smtClean="0"/>
           </a:p>
         </p:txBody>
       </p:sp>
@@ -1847,6 +1843,7 @@
           <a:p>
             <a:fld id="{FDE934FF-F4E1-47C5-9CA5-30A81DDE2BE4}" type="datetimeFigureOut">
               <a:rPr lang="en-US" smtClean="0"/>
+              <a:t>1/2/2019</a:t>
             </a:fld>
             <a:endParaRPr lang="en-US"/>
           </a:p>
@@ -1888,6 +1885,7 @@
           <a:p>
             <a:fld id="{B3561BA9-CDCF-4958-B8AB-66F3BF063E13}" type="slidenum">
               <a:rPr lang="en-US" smtClean="0"/>
+              <a:t>‹#›</a:t>
             </a:fld>
             <a:endParaRPr lang="en-US"/>
           </a:p>
@@ -1978,7 +1976,6 @@
               <a:rPr lang="en-US" smtClean="0"/>
               <a:t>Click to edit Master text styles</a:t>
             </a:r>
-            <a:endParaRPr lang="en-US" smtClean="0"/>
           </a:p>
           <a:p>
             <a:pPr lvl="1"/>
@@ -1986,7 +1983,6 @@
               <a:rPr lang="en-US" smtClean="0"/>
               <a:t>Second level</a:t>
             </a:r>
-            <a:endParaRPr lang="en-US" smtClean="0"/>
           </a:p>
           <a:p>
             <a:pPr lvl="2"/>
@@ -1994,7 +1990,6 @@
               <a:rPr lang="en-US" smtClean="0"/>
               <a:t>Third level</a:t>
             </a:r>
-            <a:endParaRPr lang="en-US" smtClean="0"/>
           </a:p>
           <a:p>
             <a:pPr lvl="3"/>
@@ -2002,7 +1997,6 @@
               <a:rPr lang="en-US" smtClean="0"/>
               <a:t>Fourth level</a:t>
             </a:r>
-            <a:endParaRPr lang="en-US" smtClean="0"/>
           </a:p>
           <a:p>
             <a:pPr lvl="4"/>
@@ -2031,6 +2025,7 @@
           <a:p>
             <a:fld id="{FDE934FF-F4E1-47C5-9CA5-30A81DDE2BE4}" type="datetimeFigureOut">
               <a:rPr lang="en-US" smtClean="0"/>
+              <a:t>1/2/2019</a:t>
             </a:fld>
             <a:endParaRPr lang="en-US"/>
           </a:p>
@@ -2072,6 +2067,7 @@
           <a:p>
             <a:fld id="{B3561BA9-CDCF-4958-B8AB-66F3BF063E13}" type="slidenum">
               <a:rPr lang="en-US" smtClean="0"/>
+              <a:t>‹#›</a:t>
             </a:fld>
             <a:endParaRPr lang="en-US"/>
           </a:p>
@@ -2170,7 +2166,6 @@
               <a:rPr lang="en-US" smtClean="0"/>
               <a:t>Click to edit Master text styles</a:t>
             </a:r>
-            <a:endParaRPr lang="en-US" smtClean="0"/>
           </a:p>
           <a:p>
             <a:pPr lvl="1"/>
@@ -2178,7 +2173,6 @@
               <a:rPr lang="en-US" smtClean="0"/>
               <a:t>Second level</a:t>
             </a:r>
-            <a:endParaRPr lang="en-US" smtClean="0"/>
           </a:p>
           <a:p>
             <a:pPr lvl="2"/>
@@ -2186,7 +2180,6 @@
               <a:rPr lang="en-US" smtClean="0"/>
               <a:t>Third level</a:t>
             </a:r>
-            <a:endParaRPr lang="en-US" smtClean="0"/>
           </a:p>
           <a:p>
             <a:pPr lvl="3"/>
@@ -2194,7 +2187,6 @@
               <a:rPr lang="en-US" smtClean="0"/>
               <a:t>Fourth level</a:t>
             </a:r>
-            <a:endParaRPr lang="en-US" smtClean="0"/>
           </a:p>
           <a:p>
             <a:pPr lvl="4"/>
@@ -2241,6 +2233,7 @@
           <a:p>
             <a:fld id="{FDE934FF-F4E1-47C5-9CA5-30A81DDE2BE4}" type="datetimeFigureOut">
               <a:rPr lang="en-US" smtClean="0"/>
+              <a:t>1/2/2019</a:t>
             </a:fld>
             <a:endParaRPr lang="en-US"/>
           </a:p>
@@ -2318,6 +2311,7 @@
           <a:p>
             <a:fld id="{B3561BA9-CDCF-4958-B8AB-66F3BF063E13}" type="slidenum">
               <a:rPr lang="en-US" smtClean="0"/>
+              <a:t>‹#›</a:t>
             </a:fld>
             <a:endParaRPr lang="en-US"/>
           </a:p>
@@ -2630,7 +2624,14 @@
         <p:cNvGrpSpPr/>
         <p:nvPr/>
       </p:nvGrpSpPr>
-      <p:grpSpPr/>
+      <p:grpSpPr>
+        <a:xfrm>
+          <a:off x="0" y="0"/>
+          <a:ext cx="0" cy="0"/>
+          <a:chOff x="0" y="0"/>
+          <a:chExt cx="0" cy="0"/>
+        </a:xfrm>
+      </p:grpSpPr>
       <p:sp>
         <p:nvSpPr>
           <p:cNvPr id="2" name="Title 1"/>
@@ -2644,12 +2645,17 @@
         <p:spPr/>
         <p:txBody>
           <a:bodyPr/>
-          <a:p>
-            <a:r>
-              <a:rPr lang="" altLang="en-US"/>
-              <a:t>CVE ID</a:t>
-            </a:r>
-            <a:endParaRPr lang="" altLang="en-US"/>
+          <a:lstStyle/>
+          <a:p>
+            <a:r>
+              <a:rPr lang="" altLang="en-US" dirty="0" smtClean="0"/>
+              <a:t>CVE</a:t>
+            </a:r>
+            <a:r>
+              <a:rPr lang="en-US" altLang="zh-CN" dirty="0" smtClean="0"/>
+              <a:t>-2015-8961</a:t>
+            </a:r>
+            <a:endParaRPr lang="" altLang="en-US" dirty="0"/>
           </a:p>
         </p:txBody>
       </p:sp>
@@ -2666,8 +2672,9 @@
         <p:spPr/>
         <p:txBody>
           <a:bodyPr/>
-          <a:p>
-            <a:endParaRPr lang="en-US"/>
+          <a:lstStyle/>
+          <a:p>
+            <a:endParaRPr lang="en-US" dirty="0"/>
           </a:p>
         </p:txBody>
       </p:sp>
@@ -2688,7 +2695,14 @@
         <p:cNvGrpSpPr/>
         <p:nvPr/>
       </p:nvGrpSpPr>
-      <p:grpSpPr/>
+      <p:grpSpPr>
+        <a:xfrm>
+          <a:off x="0" y="0"/>
+          <a:ext cx="0" cy="0"/>
+          <a:chOff x="0" y="0"/>
+          <a:chExt cx="0" cy="0"/>
+        </a:xfrm>
+      </p:grpSpPr>
       <p:sp>
         <p:nvSpPr>
           <p:cNvPr id="2" name="Title 1"/>
@@ -2702,12 +2716,12 @@
         <p:spPr/>
         <p:txBody>
           <a:bodyPr/>
+          <a:lstStyle/>
           <a:p>
             <a:r>
               <a:rPr lang="" altLang="en-US"/>
               <a:t>Description</a:t>
             </a:r>
-            <a:endParaRPr lang="" altLang="en-US"/>
           </a:p>
         </p:txBody>
       </p:sp>
@@ -2724,12 +2738,29 @@
         <p:spPr/>
         <p:txBody>
           <a:bodyPr/>
-          <a:p>
-            <a:r>
-              <a:rPr lang="" altLang="en-US"/>
-              <a:t>feel free to extend if you think one page is not enough.</a:t>
-            </a:r>
-            <a:endParaRPr lang="" altLang="en-US"/>
+          <a:lstStyle/>
+          <a:p>
+            <a:r>
+              <a:rPr lang="en-US" altLang="zh-CN" dirty="0"/>
+              <a:t>he __ext4_journal_stop function in fs/ext4/ext4_jbd2.c in the Linux kernel before 4.3.3 allows local users to gain privileges or cause a denial of service (</a:t>
+            </a:r>
+            <a:r>
+              <a:rPr lang="en-US" altLang="zh-CN" dirty="0">
+                <a:solidFill>
+                  <a:srgbClr val="FF0000"/>
+                </a:solidFill>
+              </a:rPr>
+              <a:t>use-after-free</a:t>
+            </a:r>
+            <a:r>
+              <a:rPr lang="en-US" altLang="zh-CN" dirty="0"/>
+              <a:t>) by leveraging improper access to a certain error field</a:t>
+            </a:r>
+            <a:r>
+              <a:rPr lang="en-US" altLang="zh-CN" dirty="0" smtClean="0"/>
+              <a:t>.</a:t>
+            </a:r>
+            <a:endParaRPr lang="" altLang="en-US" dirty="0"/>
           </a:p>
         </p:txBody>
       </p:sp>
@@ -2750,7 +2781,14 @@
         <p:cNvGrpSpPr/>
         <p:nvPr/>
       </p:nvGrpSpPr>
-      <p:grpSpPr/>
+      <p:grpSpPr>
+        <a:xfrm>
+          <a:off x="0" y="0"/>
+          <a:ext cx="0" cy="0"/>
+          <a:chOff x="0" y="0"/>
+          <a:chExt cx="0" cy="0"/>
+        </a:xfrm>
+      </p:grpSpPr>
       <p:sp>
         <p:nvSpPr>
           <p:cNvPr id="2" name="Title 1"/>
@@ -2764,12 +2802,12 @@
         <p:spPr/>
         <p:txBody>
           <a:bodyPr/>
+          <a:lstStyle/>
           <a:p>
             <a:r>
               <a:rPr lang="" altLang="en-US"/>
               <a:t>Root Cause</a:t>
             </a:r>
-            <a:endParaRPr lang="" altLang="en-US"/>
           </a:p>
         </p:txBody>
       </p:sp>
@@ -2786,6 +2824,7 @@
         <p:spPr/>
         <p:txBody>
           <a:bodyPr/>
+          <a:lstStyle/>
           <a:p>
             <a:r>
               <a:rPr lang="en-US" altLang="en-US">
@@ -2814,7 +2853,14 @@
         <p:cNvGrpSpPr/>
         <p:nvPr/>
       </p:nvGrpSpPr>
-      <p:grpSpPr/>
+      <p:grpSpPr>
+        <a:xfrm>
+          <a:off x="0" y="0"/>
+          <a:ext cx="0" cy="0"/>
+          <a:chOff x="0" y="0"/>
+          <a:chExt cx="0" cy="0"/>
+        </a:xfrm>
+      </p:grpSpPr>
       <p:sp>
         <p:nvSpPr>
           <p:cNvPr id="2" name="Title 1"/>
@@ -2828,12 +2874,12 @@
         <p:spPr/>
         <p:txBody>
           <a:bodyPr/>
+          <a:lstStyle/>
           <a:p>
             <a:r>
               <a:rPr lang="" altLang="en-US"/>
               <a:t>Patch</a:t>
             </a:r>
-            <a:endParaRPr lang="" altLang="en-US"/>
           </a:p>
         </p:txBody>
       </p:sp>
@@ -2850,6 +2896,7 @@
         <p:spPr/>
         <p:txBody>
           <a:bodyPr/>
+          <a:lstStyle/>
           <a:p>
             <a:r>
               <a:rPr lang="en-US" altLang="en-US">
@@ -2878,7 +2925,14 @@
         <p:cNvGrpSpPr/>
         <p:nvPr/>
       </p:nvGrpSpPr>
-      <p:grpSpPr/>
+      <p:grpSpPr>
+        <a:xfrm>
+          <a:off x="0" y="0"/>
+          <a:ext cx="0" cy="0"/>
+          <a:chOff x="0" y="0"/>
+          <a:chExt cx="0" cy="0"/>
+        </a:xfrm>
+      </p:grpSpPr>
       <p:sp>
         <p:nvSpPr>
           <p:cNvPr id="2" name="Title 1"/>
@@ -2892,12 +2946,12 @@
         <p:spPr/>
         <p:txBody>
           <a:bodyPr/>
+          <a:lstStyle/>
           <a:p>
             <a:r>
               <a:rPr lang="" altLang="en-US"/>
               <a:t>Patch Analysis</a:t>
             </a:r>
-            <a:endParaRPr lang="" altLang="en-US"/>
           </a:p>
         </p:txBody>
       </p:sp>
@@ -2914,6 +2968,7 @@
         <p:spPr/>
         <p:txBody>
           <a:bodyPr/>
+          <a:lstStyle/>
           <a:p>
             <a:r>
               <a:rPr lang="en-US" altLang="en-US">
@@ -3184,6 +3239,8 @@
       </a:bgFillStyleLst>
     </a:fmtScheme>
   </a:themeElements>
+  <a:objectDefaults/>
+  <a:extraClrSchemeLst/>
   <a:extLst>
     <a:ext uri="{05A4C25C-085E-4340-85A3-A5531E510DB2}">
       <thm15:themeFamily xmlns:thm15="http://schemas.microsoft.com/office/thememl/2012/main" name="Office Theme" id="{62F939B6-93AF-4DB8-9C6B-D6C7DFDC589F}" vid="{4A3C46E8-61CC-4603-A589-7422A47A8E4A}"/>

</xml_diff>